<commit_message>
double lens scan for caoh, laser slowing preliminaries
</commit_message>
<xml_diff>
--- a/lens_updates_sep_15.pptx
+++ b/lens_updates_sep_15.pptx
@@ -5,7 +5,7 @@
     <p:sldMasterId id="2147483648" r:id="rId1"/>
   </p:sldMasterIdLst>
   <p:notesMasterIdLst>
-    <p:notesMasterId r:id="rId9"/>
+    <p:notesMasterId r:id="rId10"/>
   </p:notesMasterIdLst>
   <p:sldIdLst>
     <p:sldId id="256" r:id="rId2"/>
@@ -14,7 +14,8 @@
     <p:sldId id="267" r:id="rId5"/>
     <p:sldId id="258" r:id="rId6"/>
     <p:sldId id="259" r:id="rId7"/>
-    <p:sldId id="260" r:id="rId8"/>
+    <p:sldId id="268" r:id="rId8"/>
+    <p:sldId id="260" r:id="rId9"/>
   </p:sldIdLst>
   <p:sldSz cx="12192000" cy="6858000"/>
   <p:notesSz cx="6858000" cy="9144000"/>
@@ -5323,50 +5324,31 @@
       </p:sp>
       <p:sp>
         <p:nvSpPr>
-          <p:cNvPr id="8" name="TextBox 7">
-            <a:extLst>
-              <a:ext uri="{FF2B5EF4-FFF2-40B4-BE49-F238E27FC236}">
-                <a16:creationId xmlns:a16="http://schemas.microsoft.com/office/drawing/2014/main" id="{F3782FA0-0C4A-F144-9106-57A10635A0BF}"/>
-              </a:ext>
-            </a:extLst>
-          </p:cNvPr>
-          <p:cNvSpPr txBox="1"/>
-          <p:nvPr/>
-        </p:nvSpPr>
-        <p:spPr>
-          <a:xfrm>
-            <a:off x="8273142" y="1371373"/>
-            <a:ext cx="3799115" cy="954107"/>
-          </a:xfrm>
-          <a:prstGeom prst="rect">
-            <a:avLst/>
-          </a:prstGeom>
-          <a:noFill/>
-        </p:spPr>
-        <p:txBody>
-          <a:bodyPr wrap="square" rtlCol="0">
-            <a:spAutoFit/>
-          </a:bodyPr>
-          <a:lstStyle/>
-          <a:p>
-            <a:pPr marL="285750" indent="-285750">
-              <a:buFont typeface="Arial" panose="020B0604020202020204" pitchFamily="34" charset="0"/>
-              <a:buChar char="•"/>
-            </a:pPr>
-            <a:r>
-              <a:rPr lang="en-US" sz="2800" dirty="0"/>
-              <a:t>Lorem ipsum</a:t>
-            </a:r>
-          </a:p>
-          <a:p>
-            <a:pPr marL="285750" indent="-285750">
-              <a:buFont typeface="Arial" panose="020B0604020202020204" pitchFamily="34" charset="0"/>
-              <a:buChar char="•"/>
-            </a:pPr>
-            <a:r>
-              <a:rPr lang="en-US" sz="2800" dirty="0"/>
-              <a:t>Lorem ipsum</a:t>
-            </a:r>
+          <p:cNvPr id="5" name="Content Placeholder 2">
+            <a:extLst>
+              <a:ext uri="{FF2B5EF4-FFF2-40B4-BE49-F238E27FC236}">
+                <a16:creationId xmlns:a16="http://schemas.microsoft.com/office/drawing/2014/main" id="{A4B903C6-3EC5-B04A-A0CF-3FCE4DE2CF00}"/>
+              </a:ext>
+            </a:extLst>
+          </p:cNvPr>
+          <p:cNvSpPr>
+            <a:spLocks noGrp="1"/>
+          </p:cNvSpPr>
+          <p:nvPr>
+            <p:ph idx="1"/>
+          </p:nvPr>
+        </p:nvSpPr>
+        <p:spPr>
+          <a:xfrm>
+            <a:off x="838200" y="1825625"/>
+            <a:ext cx="10515600" cy="4351338"/>
+          </a:xfrm>
+        </p:spPr>
+        <p:txBody>
+          <a:bodyPr/>
+          <a:lstStyle/>
+          <a:p>
+            <a:endParaRPr lang="en-US" dirty="0"/>
           </a:p>
         </p:txBody>
       </p:sp>
@@ -5422,12 +5404,8 @@
           <a:lstStyle/>
           <a:p>
             <a:r>
-              <a:rPr lang="en-US" dirty="0" err="1"/>
-              <a:t>Slowable</a:t>
-            </a:r>
-            <a:r>
               <a:rPr lang="en-US" dirty="0"/>
-              <a:t> Molecules</a:t>
+              <a:t>Capturable Molecules</a:t>
             </a:r>
           </a:p>
         </p:txBody>
@@ -5453,7 +5431,7 @@
           <a:bodyPr/>
           <a:lstStyle/>
           <a:p>
-            <a:endParaRPr lang="en-US"/>
+            <a:endParaRPr lang="en-US" dirty="0"/>
           </a:p>
         </p:txBody>
       </p:sp>
@@ -5510,7 +5488,7 @@
           <a:p>
             <a:r>
               <a:rPr lang="en-US" dirty="0"/>
-              <a:t>Axial Length Scan</a:t>
+              <a:t>Varying Lens Axial Length</a:t>
             </a:r>
           </a:p>
         </p:txBody>
@@ -5600,18 +5578,117 @@
       </p:sp>
       <p:sp>
         <p:nvSpPr>
-          <p:cNvPr id="3" name="Content Placeholder 2">
-            <a:extLst>
-              <a:ext uri="{FF2B5EF4-FFF2-40B4-BE49-F238E27FC236}">
-                <a16:creationId xmlns:a16="http://schemas.microsoft.com/office/drawing/2014/main" id="{90172C35-0681-A441-8817-7DF3C14C1F95}"/>
-              </a:ext>
-            </a:extLst>
-          </p:cNvPr>
-          <p:cNvSpPr>
-            <a:spLocks noGrp="1"/>
-          </p:cNvSpPr>
-          <p:nvPr>
-            <p:ph idx="1"/>
+          <p:cNvPr id="6" name="TextBox 5">
+            <a:extLst>
+              <a:ext uri="{FF2B5EF4-FFF2-40B4-BE49-F238E27FC236}">
+                <a16:creationId xmlns:a16="http://schemas.microsoft.com/office/drawing/2014/main" id="{ECC8F855-6A0A-5C4E-B2B6-ED6ABF85AC85}"/>
+              </a:ext>
+            </a:extLst>
+          </p:cNvPr>
+          <p:cNvSpPr txBox="1"/>
+          <p:nvPr/>
+        </p:nvSpPr>
+        <p:spPr>
+          <a:xfrm>
+            <a:off x="319769" y="1542725"/>
+            <a:ext cx="3280682" cy="3108543"/>
+          </a:xfrm>
+          <a:prstGeom prst="rect">
+            <a:avLst/>
+          </a:prstGeom>
+          <a:noFill/>
+        </p:spPr>
+        <p:txBody>
+          <a:bodyPr wrap="square" rtlCol="0">
+            <a:spAutoFit/>
+          </a:bodyPr>
+          <a:lstStyle/>
+          <a:p>
+            <a:pPr marL="285750" indent="-285750">
+              <a:buFont typeface="Arial" panose="020B0604020202020204" pitchFamily="34" charset="0"/>
+              <a:buChar char="•"/>
+            </a:pPr>
+            <a:r>
+              <a:rPr lang="en-US" sz="2800" dirty="0"/>
+              <a:t>See evidence of turning inwards; the trajectories actually reverse direction in the magnet and are funneled inwards</a:t>
+            </a:r>
+          </a:p>
+        </p:txBody>
+      </p:sp>
+      <p:pic>
+        <p:nvPicPr>
+          <p:cNvPr id="7" name="Picture 6" descr="A close up of a map&#10;&#10;Description automatically generated">
+            <a:extLst>
+              <a:ext uri="{FF2B5EF4-FFF2-40B4-BE49-F238E27FC236}">
+                <a16:creationId xmlns:a16="http://schemas.microsoft.com/office/drawing/2014/main" id="{02BAEFCA-F620-EF40-8DED-F57A69A90607}"/>
+              </a:ext>
+            </a:extLst>
+          </p:cNvPr>
+          <p:cNvPicPr>
+            <a:picLocks noChangeAspect="1"/>
+          </p:cNvPicPr>
+          <p:nvPr/>
+        </p:nvPicPr>
+        <p:blipFill>
+          <a:blip r:embed="rId2"/>
+          <a:stretch>
+            <a:fillRect/>
+          </a:stretch>
+        </p:blipFill>
+        <p:spPr>
+          <a:xfrm>
+            <a:off x="3600451" y="1362473"/>
+            <a:ext cx="7011987" cy="5258990"/>
+          </a:xfrm>
+          <a:prstGeom prst="rect">
+            <a:avLst/>
+          </a:prstGeom>
+        </p:spPr>
+      </p:pic>
+    </p:spTree>
+    <p:extLst>
+      <p:ext uri="{BB962C8B-B14F-4D97-AF65-F5344CB8AC3E}">
+        <p14:creationId xmlns:p14="http://schemas.microsoft.com/office/powerpoint/2010/main" val="1920144063"/>
+      </p:ext>
+    </p:extLst>
+  </p:cSld>
+  <p:clrMapOvr>
+    <a:masterClrMapping/>
+  </p:clrMapOvr>
+</p:sld>
+</file>
+
+<file path=ppt/slides/slide8.xml><?xml version="1.0" encoding="utf-8"?>
+<p:sld xmlns:a="http://schemas.openxmlformats.org/drawingml/2006/main" xmlns:r="http://schemas.openxmlformats.org/officeDocument/2006/relationships" xmlns:p="http://schemas.openxmlformats.org/presentationml/2006/main">
+  <p:cSld>
+    <p:spTree>
+      <p:nvGrpSpPr>
+        <p:cNvPr id="1" name=""/>
+        <p:cNvGrpSpPr/>
+        <p:nvPr/>
+      </p:nvGrpSpPr>
+      <p:grpSpPr>
+        <a:xfrm>
+          <a:off x="0" y="0"/>
+          <a:ext cx="0" cy="0"/>
+          <a:chOff x="0" y="0"/>
+          <a:chExt cx="0" cy="0"/>
+        </a:xfrm>
+      </p:grpSpPr>
+      <p:sp>
+        <p:nvSpPr>
+          <p:cNvPr id="2" name="Title 1">
+            <a:extLst>
+              <a:ext uri="{FF2B5EF4-FFF2-40B4-BE49-F238E27FC236}">
+                <a16:creationId xmlns:a16="http://schemas.microsoft.com/office/drawing/2014/main" id="{7C9F8FC8-3A34-AC45-AE8F-DE884FD8A3B3}"/>
+              </a:ext>
+            </a:extLst>
+          </p:cNvPr>
+          <p:cNvSpPr>
+            <a:spLocks noGrp="1"/>
+          </p:cNvSpPr>
+          <p:nvPr>
+            <p:ph type="title"/>
           </p:nvPr>
         </p:nvSpPr>
         <p:spPr/>
@@ -5619,7 +5696,89 @@
           <a:bodyPr/>
           <a:lstStyle/>
           <a:p>
-            <a:endParaRPr lang="en-US"/>
+            <a:r>
+              <a:rPr lang="en-US" dirty="0"/>
+              <a:t>Laser Slowing: Preliminary Results</a:t>
+            </a:r>
+          </a:p>
+        </p:txBody>
+      </p:sp>
+      <p:pic>
+        <p:nvPicPr>
+          <p:cNvPr id="5" name="Picture 4">
+            <a:extLst>
+              <a:ext uri="{FF2B5EF4-FFF2-40B4-BE49-F238E27FC236}">
+                <a16:creationId xmlns:a16="http://schemas.microsoft.com/office/drawing/2014/main" id="{0B4D99B2-8734-1041-B936-A2BF16C85CE5}"/>
+              </a:ext>
+            </a:extLst>
+          </p:cNvPr>
+          <p:cNvPicPr>
+            <a:picLocks noChangeAspect="1"/>
+          </p:cNvPicPr>
+          <p:nvPr/>
+        </p:nvPicPr>
+        <p:blipFill>
+          <a:blip r:embed="rId2"/>
+          <a:stretch>
+            <a:fillRect/>
+          </a:stretch>
+        </p:blipFill>
+        <p:spPr>
+          <a:xfrm>
+            <a:off x="3600450" y="1424668"/>
+            <a:ext cx="7753350" cy="5068207"/>
+          </a:xfrm>
+          <a:prstGeom prst="rect">
+            <a:avLst/>
+          </a:prstGeom>
+        </p:spPr>
+      </p:pic>
+      <p:sp>
+        <p:nvSpPr>
+          <p:cNvPr id="6" name="TextBox 5">
+            <a:extLst>
+              <a:ext uri="{FF2B5EF4-FFF2-40B4-BE49-F238E27FC236}">
+                <a16:creationId xmlns:a16="http://schemas.microsoft.com/office/drawing/2014/main" id="{ECC8F855-6A0A-5C4E-B2B6-ED6ABF85AC85}"/>
+              </a:ext>
+            </a:extLst>
+          </p:cNvPr>
+          <p:cNvSpPr txBox="1"/>
+          <p:nvPr/>
+        </p:nvSpPr>
+        <p:spPr>
+          <a:xfrm>
+            <a:off x="319769" y="1542725"/>
+            <a:ext cx="3280682" cy="4832092"/>
+          </a:xfrm>
+          <a:prstGeom prst="rect">
+            <a:avLst/>
+          </a:prstGeom>
+          <a:noFill/>
+        </p:spPr>
+        <p:txBody>
+          <a:bodyPr wrap="square" rtlCol="0">
+            <a:spAutoFit/>
+          </a:bodyPr>
+          <a:lstStyle/>
+          <a:p>
+            <a:pPr marL="285750" indent="-285750">
+              <a:buFont typeface="Arial" panose="020B0604020202020204" pitchFamily="34" charset="0"/>
+              <a:buChar char="•"/>
+            </a:pPr>
+            <a:r>
+              <a:rPr lang="en-US" sz="2800" dirty="0"/>
+              <a:t>Number enhancement is maximized when laser slowing with a lens placement slightly further</a:t>
+            </a:r>
+          </a:p>
+          <a:p>
+            <a:pPr marL="285750" indent="-285750">
+              <a:buFont typeface="Arial" panose="020B0604020202020204" pitchFamily="34" charset="0"/>
+              <a:buChar char="•"/>
+            </a:pPr>
+            <a:r>
+              <a:rPr lang="en-US" sz="2800" dirty="0"/>
+              <a:t>Preliminary; ran with only 1e2 molecules, no spatial distribution (runtime)</a:t>
+            </a:r>
           </a:p>
         </p:txBody>
       </p:sp>

</xml_diff>